<commit_message>
feat(#72): further improved techstack slide
</commit_message>
<xml_diff>
--- a/docs/techstack-eispunkt.pptx
+++ b/docs/techstack-eispunkt.pptx
@@ -118,7 +118,7 @@
 <file path=ppt/revisionInfo.xml><?xml version="1.0" encoding="utf-8"?>
 <p1510:revInfo xmlns:a="http://schemas.openxmlformats.org/drawingml/2006/main" xmlns:r="http://schemas.openxmlformats.org/officeDocument/2006/relationships" xmlns:p1510="http://schemas.microsoft.com/office/powerpoint/2015/10/main">
   <p1510:revLst>
-    <p1510:client id="{58AF525E-BDD0-8748-A113-7FE6D1D193A8}" v="127" dt="2026-01-27T07:43:00.641"/>
+    <p1510:client id="{58AF525E-BDD0-8748-A113-7FE6D1D193A8}" v="128" dt="2026-01-27T09:53:01.801"/>
   </p1510:revLst>
 </p1510:revInfo>
 </file>
@@ -128,7 +128,7 @@
   <pc:docChgLst>
     <pc:chgData name="Hayer Florian" userId="866d4ef7-f65d-4e61-9597-0542b71a7f4d" providerId="ADAL" clId="{731FFF11-6A53-5520-B035-B81EF8E0644C}"/>
     <pc:docChg chg="undo custSel addSld delSld modSld">
-      <pc:chgData name="Hayer Florian" userId="866d4ef7-f65d-4e61-9597-0542b71a7f4d" providerId="ADAL" clId="{731FFF11-6A53-5520-B035-B81EF8E0644C}" dt="2026-01-27T07:45:09.868" v="520" actId="2696"/>
+      <pc:chgData name="Hayer Florian" userId="866d4ef7-f65d-4e61-9597-0542b71a7f4d" providerId="ADAL" clId="{731FFF11-6A53-5520-B035-B81EF8E0644C}" dt="2026-01-27T09:53:10.464" v="522" actId="1076"/>
       <pc:docMkLst>
         <pc:docMk/>
       </pc:docMkLst>
@@ -145,17 +145,9 @@
           <pc:docMk/>
           <pc:sldMk cId="4060404258" sldId="257"/>
         </pc:sldMkLst>
-        <pc:inkChg chg="add">
-          <ac:chgData name="Hayer Florian" userId="866d4ef7-f65d-4e61-9597-0542b71a7f4d" providerId="ADAL" clId="{731FFF11-6A53-5520-B035-B81EF8E0644C}" dt="2026-01-13T08:35:44.903" v="0" actId="9405"/>
-          <ac:inkMkLst>
-            <pc:docMk/>
-            <pc:sldMk cId="4060404258" sldId="257"/>
-            <ac:inkMk id="38" creationId="{DCC561A4-6410-411A-7334-FF8DC6C81EBC}"/>
-          </ac:inkMkLst>
-        </pc:inkChg>
       </pc:sldChg>
       <pc:sldChg chg="addSp delSp modSp new mod">
-        <pc:chgData name="Hayer Florian" userId="866d4ef7-f65d-4e61-9597-0542b71a7f4d" providerId="ADAL" clId="{731FFF11-6A53-5520-B035-B81EF8E0644C}" dt="2026-01-27T07:43:00.641" v="517" actId="1076"/>
+        <pc:chgData name="Hayer Florian" userId="866d4ef7-f65d-4e61-9597-0542b71a7f4d" providerId="ADAL" clId="{731FFF11-6A53-5520-B035-B81EF8E0644C}" dt="2026-01-27T09:53:10.464" v="522" actId="1076"/>
         <pc:sldMkLst>
           <pc:docMk/>
           <pc:sldMk cId="1666210458" sldId="258"/>
@@ -777,7 +769,7 @@
           </ac:grpSpMkLst>
         </pc:grpChg>
         <pc:grpChg chg="mod">
-          <ac:chgData name="Hayer Florian" userId="866d4ef7-f65d-4e61-9597-0542b71a7f4d" providerId="ADAL" clId="{731FFF11-6A53-5520-B035-B81EF8E0644C}" dt="2026-01-27T07:41:20.353" v="477"/>
+          <ac:chgData name="Hayer Florian" userId="866d4ef7-f65d-4e61-9597-0542b71a7f4d" providerId="ADAL" clId="{731FFF11-6A53-5520-B035-B81EF8E0644C}" dt="2026-01-27T09:53:01.800" v="521" actId="1076"/>
           <ac:grpSpMkLst>
             <pc:docMk/>
             <pc:sldMk cId="1666210458" sldId="258"/>
@@ -809,7 +801,7 @@
           </ac:grpSpMkLst>
         </pc:grpChg>
         <pc:grpChg chg="mod">
-          <ac:chgData name="Hayer Florian" userId="866d4ef7-f65d-4e61-9597-0542b71a7f4d" providerId="ADAL" clId="{731FFF11-6A53-5520-B035-B81EF8E0644C}" dt="2026-01-27T07:42:25.608" v="509"/>
+          <ac:chgData name="Hayer Florian" userId="866d4ef7-f65d-4e61-9597-0542b71a7f4d" providerId="ADAL" clId="{731FFF11-6A53-5520-B035-B81EF8E0644C}" dt="2026-01-27T09:53:10.464" v="522" actId="1076"/>
           <ac:grpSpMkLst>
             <pc:docMk/>
             <pc:sldMk cId="1666210458" sldId="258"/>
@@ -825,7 +817,7 @@
           </ac:grpSpMkLst>
         </pc:grpChg>
         <pc:grpChg chg="mod">
-          <ac:chgData name="Hayer Florian" userId="866d4ef7-f65d-4e61-9597-0542b71a7f4d" providerId="ADAL" clId="{731FFF11-6A53-5520-B035-B81EF8E0644C}" dt="2026-01-27T07:42:25.608" v="509"/>
+          <ac:chgData name="Hayer Florian" userId="866d4ef7-f65d-4e61-9597-0542b71a7f4d" providerId="ADAL" clId="{731FFF11-6A53-5520-B035-B81EF8E0644C}" dt="2026-01-27T09:53:10.464" v="522" actId="1076"/>
           <ac:grpSpMkLst>
             <pc:docMk/>
             <pc:sldMk cId="1666210458" sldId="258"/>
@@ -881,7 +873,7 @@
           </ac:picMkLst>
         </pc:picChg>
         <pc:picChg chg="add mod">
-          <ac:chgData name="Hayer Florian" userId="866d4ef7-f65d-4e61-9597-0542b71a7f4d" providerId="ADAL" clId="{731FFF11-6A53-5520-B035-B81EF8E0644C}" dt="2026-01-27T07:37:45.056" v="331" actId="1076"/>
+          <ac:chgData name="Hayer Florian" userId="866d4ef7-f65d-4e61-9597-0542b71a7f4d" providerId="ADAL" clId="{731FFF11-6A53-5520-B035-B81EF8E0644C}" dt="2026-01-27T09:53:01.800" v="521" actId="1076"/>
           <ac:picMkLst>
             <pc:docMk/>
             <pc:sldMk cId="1666210458" sldId="258"/>
@@ -889,7 +881,7 @@
           </ac:picMkLst>
         </pc:picChg>
         <pc:picChg chg="add mod">
-          <ac:chgData name="Hayer Florian" userId="866d4ef7-f65d-4e61-9597-0542b71a7f4d" providerId="ADAL" clId="{731FFF11-6A53-5520-B035-B81EF8E0644C}" dt="2026-01-27T07:38:33.594" v="398" actId="1076"/>
+          <ac:chgData name="Hayer Florian" userId="866d4ef7-f65d-4e61-9597-0542b71a7f4d" providerId="ADAL" clId="{731FFF11-6A53-5520-B035-B81EF8E0644C}" dt="2026-01-27T09:53:01.800" v="521" actId="1076"/>
           <ac:picMkLst>
             <pc:docMk/>
             <pc:sldMk cId="1666210458" sldId="258"/>
@@ -913,7 +905,7 @@
           </ac:picMkLst>
         </pc:picChg>
         <pc:picChg chg="add mod">
-          <ac:chgData name="Hayer Florian" userId="866d4ef7-f65d-4e61-9597-0542b71a7f4d" providerId="ADAL" clId="{731FFF11-6A53-5520-B035-B81EF8E0644C}" dt="2026-01-27T07:38:32.209" v="397" actId="1076"/>
+          <ac:chgData name="Hayer Florian" userId="866d4ef7-f65d-4e61-9597-0542b71a7f4d" providerId="ADAL" clId="{731FFF11-6A53-5520-B035-B81EF8E0644C}" dt="2026-01-27T09:53:01.800" v="521" actId="1076"/>
           <ac:picMkLst>
             <pc:docMk/>
             <pc:sldMk cId="1666210458" sldId="258"/>
@@ -1649,7 +1641,7 @@
           </ac:inkMkLst>
         </pc:inkChg>
         <pc:inkChg chg="add mod">
-          <ac:chgData name="Hayer Florian" userId="866d4ef7-f65d-4e61-9597-0542b71a7f4d" providerId="ADAL" clId="{731FFF11-6A53-5520-B035-B81EF8E0644C}" dt="2026-01-27T07:41:20.353" v="477"/>
+          <ac:chgData name="Hayer Florian" userId="866d4ef7-f65d-4e61-9597-0542b71a7f4d" providerId="ADAL" clId="{731FFF11-6A53-5520-B035-B81EF8E0644C}" dt="2026-01-27T09:53:01.800" v="521" actId="1076"/>
           <ac:inkMkLst>
             <pc:docMk/>
             <pc:sldMk cId="1666210458" sldId="258"/>
@@ -1665,7 +1657,7 @@
           </ac:inkMkLst>
         </pc:inkChg>
         <pc:inkChg chg="add mod">
-          <ac:chgData name="Hayer Florian" userId="866d4ef7-f65d-4e61-9597-0542b71a7f4d" providerId="ADAL" clId="{731FFF11-6A53-5520-B035-B81EF8E0644C}" dt="2026-01-27T07:41:20.353" v="477"/>
+          <ac:chgData name="Hayer Florian" userId="866d4ef7-f65d-4e61-9597-0542b71a7f4d" providerId="ADAL" clId="{731FFF11-6A53-5520-B035-B81EF8E0644C}" dt="2026-01-27T09:53:01.800" v="521" actId="1076"/>
           <ac:inkMkLst>
             <pc:docMk/>
             <pc:sldMk cId="1666210458" sldId="258"/>
@@ -1697,7 +1689,7 @@
           </ac:inkMkLst>
         </pc:inkChg>
         <pc:inkChg chg="add mod">
-          <ac:chgData name="Hayer Florian" userId="866d4ef7-f65d-4e61-9597-0542b71a7f4d" providerId="ADAL" clId="{731FFF11-6A53-5520-B035-B81EF8E0644C}" dt="2026-01-27T07:41:14.904" v="473"/>
+          <ac:chgData name="Hayer Florian" userId="866d4ef7-f65d-4e61-9597-0542b71a7f4d" providerId="ADAL" clId="{731FFF11-6A53-5520-B035-B81EF8E0644C}" dt="2026-01-27T09:53:01.800" v="521" actId="1076"/>
           <ac:inkMkLst>
             <pc:docMk/>
             <pc:sldMk cId="1666210458" sldId="258"/>
@@ -1745,7 +1737,7 @@
           </ac:inkMkLst>
         </pc:inkChg>
         <pc:inkChg chg="add mod">
-          <ac:chgData name="Hayer Florian" userId="866d4ef7-f65d-4e61-9597-0542b71a7f4d" providerId="ADAL" clId="{731FFF11-6A53-5520-B035-B81EF8E0644C}" dt="2026-01-27T07:41:20.353" v="477"/>
+          <ac:chgData name="Hayer Florian" userId="866d4ef7-f65d-4e61-9597-0542b71a7f4d" providerId="ADAL" clId="{731FFF11-6A53-5520-B035-B81EF8E0644C}" dt="2026-01-27T09:53:01.800" v="521" actId="1076"/>
           <ac:inkMkLst>
             <pc:docMk/>
             <pc:sldMk cId="1666210458" sldId="258"/>
@@ -1761,7 +1753,7 @@
           </ac:inkMkLst>
         </pc:inkChg>
         <pc:inkChg chg="add mod">
-          <ac:chgData name="Hayer Florian" userId="866d4ef7-f65d-4e61-9597-0542b71a7f4d" providerId="ADAL" clId="{731FFF11-6A53-5520-B035-B81EF8E0644C}" dt="2026-01-27T07:41:20.353" v="477"/>
+          <ac:chgData name="Hayer Florian" userId="866d4ef7-f65d-4e61-9597-0542b71a7f4d" providerId="ADAL" clId="{731FFF11-6A53-5520-B035-B81EF8E0644C}" dt="2026-01-27T09:53:01.800" v="521" actId="1076"/>
           <ac:inkMkLst>
             <pc:docMk/>
             <pc:sldMk cId="1666210458" sldId="258"/>
@@ -1777,7 +1769,7 @@
           </ac:inkMkLst>
         </pc:inkChg>
         <pc:inkChg chg="add mod">
-          <ac:chgData name="Hayer Florian" userId="866d4ef7-f65d-4e61-9597-0542b71a7f4d" providerId="ADAL" clId="{731FFF11-6A53-5520-B035-B81EF8E0644C}" dt="2026-01-27T07:41:20.353" v="477"/>
+          <ac:chgData name="Hayer Florian" userId="866d4ef7-f65d-4e61-9597-0542b71a7f4d" providerId="ADAL" clId="{731FFF11-6A53-5520-B035-B81EF8E0644C}" dt="2026-01-27T09:53:01.800" v="521" actId="1076"/>
           <ac:inkMkLst>
             <pc:docMk/>
             <pc:sldMk cId="1666210458" sldId="258"/>
@@ -10216,8 +10208,8 @@
             <a:chExt cx="474480" cy="662760"/>
           </a:xfrm>
         </p:grpSpPr>
-        <mc:AlternateContent xmlns:mc="http://schemas.openxmlformats.org/markup-compatibility/2006">
-          <mc:Choice xmlns:p14="http://schemas.microsoft.com/office/powerpoint/2010/main" xmlns:aink="http://schemas.microsoft.com/office/drawing/2016/ink" Requires="p14 aink">
+        <mc:AlternateContent xmlns:mc="http://schemas.openxmlformats.org/markup-compatibility/2006" xmlns:p14="http://schemas.microsoft.com/office/powerpoint/2010/main" xmlns:aink="http://schemas.microsoft.com/office/drawing/2016/ink">
+          <mc:Choice Requires="p14 aink">
             <p:contentPart p14:bwMode="auto" r:id="rId2">
               <p14:nvContentPartPr>
                 <p14:cNvPr id="24" name="Ink 23">
@@ -10236,7 +10228,7 @@
               </p14:xfrm>
             </p:contentPart>
           </mc:Choice>
-          <mc:Fallback>
+          <mc:Fallback xmlns="">
             <p:pic>
               <p:nvPicPr>
                 <p:cNvPr id="24" name="Ink 23">
@@ -10267,8 +10259,8 @@
             </p:pic>
           </mc:Fallback>
         </mc:AlternateContent>
-        <mc:AlternateContent xmlns:mc="http://schemas.openxmlformats.org/markup-compatibility/2006">
-          <mc:Choice xmlns:p14="http://schemas.microsoft.com/office/powerpoint/2010/main" xmlns:aink="http://schemas.microsoft.com/office/drawing/2016/ink" Requires="p14 aink">
+        <mc:AlternateContent xmlns:mc="http://schemas.openxmlformats.org/markup-compatibility/2006" xmlns:p14="http://schemas.microsoft.com/office/powerpoint/2010/main" xmlns:aink="http://schemas.microsoft.com/office/drawing/2016/ink">
+          <mc:Choice Requires="p14 aink">
             <p:contentPart p14:bwMode="auto" r:id="rId4">
               <p14:nvContentPartPr>
                 <p14:cNvPr id="25" name="Ink 24">
@@ -10287,7 +10279,7 @@
               </p14:xfrm>
             </p:contentPart>
           </mc:Choice>
-          <mc:Fallback>
+          <mc:Fallback xmlns="">
             <p:pic>
               <p:nvPicPr>
                 <p:cNvPr id="25" name="Ink 24">
@@ -10318,8 +10310,8 @@
             </p:pic>
           </mc:Fallback>
         </mc:AlternateContent>
-        <mc:AlternateContent xmlns:mc="http://schemas.openxmlformats.org/markup-compatibility/2006">
-          <mc:Choice xmlns:p14="http://schemas.microsoft.com/office/powerpoint/2010/main" xmlns:aink="http://schemas.microsoft.com/office/drawing/2016/ink" Requires="p14 aink">
+        <mc:AlternateContent xmlns:mc="http://schemas.openxmlformats.org/markup-compatibility/2006" xmlns:p14="http://schemas.microsoft.com/office/powerpoint/2010/main" xmlns:aink="http://schemas.microsoft.com/office/drawing/2016/ink">
+          <mc:Choice Requires="p14 aink">
             <p:contentPart p14:bwMode="auto" r:id="rId6">
               <p14:nvContentPartPr>
                 <p14:cNvPr id="32" name="Ink 31">
@@ -10338,7 +10330,7 @@
               </p14:xfrm>
             </p:contentPart>
           </mc:Choice>
-          <mc:Fallback>
+          <mc:Fallback xmlns="">
             <p:pic>
               <p:nvPicPr>
                 <p:cNvPr id="32" name="Ink 31">
@@ -10390,8 +10382,8 @@
             <a:chExt cx="1753920" cy="681120"/>
           </a:xfrm>
         </p:grpSpPr>
-        <mc:AlternateContent xmlns:mc="http://schemas.openxmlformats.org/markup-compatibility/2006">
-          <mc:Choice xmlns:p14="http://schemas.microsoft.com/office/powerpoint/2010/main" xmlns:aink="http://schemas.microsoft.com/office/drawing/2016/ink" Requires="p14 aink">
+        <mc:AlternateContent xmlns:mc="http://schemas.openxmlformats.org/markup-compatibility/2006" xmlns:p14="http://schemas.microsoft.com/office/powerpoint/2010/main" xmlns:aink="http://schemas.microsoft.com/office/drawing/2016/ink">
+          <mc:Choice Requires="p14 aink">
             <p:contentPart p14:bwMode="auto" r:id="rId8">
               <p14:nvContentPartPr>
                 <p14:cNvPr id="44" name="Ink 43">
@@ -10410,7 +10402,7 @@
               </p14:xfrm>
             </p:contentPart>
           </mc:Choice>
-          <mc:Fallback>
+          <mc:Fallback xmlns="">
             <p:pic>
               <p:nvPicPr>
                 <p:cNvPr id="44" name="Ink 43">
@@ -10441,8 +10433,8 @@
             </p:pic>
           </mc:Fallback>
         </mc:AlternateContent>
-        <mc:AlternateContent xmlns:mc="http://schemas.openxmlformats.org/markup-compatibility/2006">
-          <mc:Choice xmlns:p14="http://schemas.microsoft.com/office/powerpoint/2010/main" xmlns:aink="http://schemas.microsoft.com/office/drawing/2016/ink" Requires="p14 aink">
+        <mc:AlternateContent xmlns:mc="http://schemas.openxmlformats.org/markup-compatibility/2006" xmlns:p14="http://schemas.microsoft.com/office/powerpoint/2010/main" xmlns:aink="http://schemas.microsoft.com/office/drawing/2016/ink">
+          <mc:Choice Requires="p14 aink">
             <p:contentPart p14:bwMode="auto" r:id="rId10">
               <p14:nvContentPartPr>
                 <p14:cNvPr id="45" name="Ink 44">
@@ -10461,7 +10453,7 @@
               </p14:xfrm>
             </p:contentPart>
           </mc:Choice>
-          <mc:Fallback>
+          <mc:Fallback xmlns="">
             <p:pic>
               <p:nvPicPr>
                 <p:cNvPr id="45" name="Ink 44">
@@ -10492,8 +10484,8 @@
             </p:pic>
           </mc:Fallback>
         </mc:AlternateContent>
-        <mc:AlternateContent xmlns:mc="http://schemas.openxmlformats.org/markup-compatibility/2006">
-          <mc:Choice xmlns:p14="http://schemas.microsoft.com/office/powerpoint/2010/main" xmlns:aink="http://schemas.microsoft.com/office/drawing/2016/ink" Requires="p14 aink">
+        <mc:AlternateContent xmlns:mc="http://schemas.openxmlformats.org/markup-compatibility/2006" xmlns:p14="http://schemas.microsoft.com/office/powerpoint/2010/main" xmlns:aink="http://schemas.microsoft.com/office/drawing/2016/ink">
+          <mc:Choice Requires="p14 aink">
             <p:contentPart p14:bwMode="auto" r:id="rId12">
               <p14:nvContentPartPr>
                 <p14:cNvPr id="46" name="Ink 45">
@@ -10512,7 +10504,7 @@
               </p14:xfrm>
             </p:contentPart>
           </mc:Choice>
-          <mc:Fallback>
+          <mc:Fallback xmlns="">
             <p:pic>
               <p:nvPicPr>
                 <p:cNvPr id="46" name="Ink 45">
@@ -10543,8 +10535,8 @@
             </p:pic>
           </mc:Fallback>
         </mc:AlternateContent>
-        <mc:AlternateContent xmlns:mc="http://schemas.openxmlformats.org/markup-compatibility/2006">
-          <mc:Choice xmlns:p14="http://schemas.microsoft.com/office/powerpoint/2010/main" xmlns:aink="http://schemas.microsoft.com/office/drawing/2016/ink" Requires="p14 aink">
+        <mc:AlternateContent xmlns:mc="http://schemas.openxmlformats.org/markup-compatibility/2006" xmlns:p14="http://schemas.microsoft.com/office/powerpoint/2010/main" xmlns:aink="http://schemas.microsoft.com/office/drawing/2016/ink">
+          <mc:Choice Requires="p14 aink">
             <p:contentPart p14:bwMode="auto" r:id="rId14">
               <p14:nvContentPartPr>
                 <p14:cNvPr id="49" name="Ink 48">
@@ -10563,7 +10555,7 @@
               </p14:xfrm>
             </p:contentPart>
           </mc:Choice>
-          <mc:Fallback>
+          <mc:Fallback xmlns="">
             <p:pic>
               <p:nvPicPr>
                 <p:cNvPr id="49" name="Ink 48">
@@ -10594,8 +10586,8 @@
             </p:pic>
           </mc:Fallback>
         </mc:AlternateContent>
-        <mc:AlternateContent xmlns:mc="http://schemas.openxmlformats.org/markup-compatibility/2006">
-          <mc:Choice xmlns:p14="http://schemas.microsoft.com/office/powerpoint/2010/main" xmlns:aink="http://schemas.microsoft.com/office/drawing/2016/ink" Requires="p14 aink">
+        <mc:AlternateContent xmlns:mc="http://schemas.openxmlformats.org/markup-compatibility/2006" xmlns:p14="http://schemas.microsoft.com/office/powerpoint/2010/main" xmlns:aink="http://schemas.microsoft.com/office/drawing/2016/ink">
+          <mc:Choice Requires="p14 aink">
             <p:contentPart p14:bwMode="auto" r:id="rId16">
               <p14:nvContentPartPr>
                 <p14:cNvPr id="69" name="Ink 68">
@@ -10614,7 +10606,7 @@
               </p14:xfrm>
             </p:contentPart>
           </mc:Choice>
-          <mc:Fallback>
+          <mc:Fallback xmlns="">
             <p:pic>
               <p:nvPicPr>
                 <p:cNvPr id="69" name="Ink 68">
@@ -10645,8 +10637,8 @@
             </p:pic>
           </mc:Fallback>
         </mc:AlternateContent>
-        <mc:AlternateContent xmlns:mc="http://schemas.openxmlformats.org/markup-compatibility/2006">
-          <mc:Choice xmlns:p14="http://schemas.microsoft.com/office/powerpoint/2010/main" xmlns:aink="http://schemas.microsoft.com/office/drawing/2016/ink" Requires="p14 aink">
+        <mc:AlternateContent xmlns:mc="http://schemas.openxmlformats.org/markup-compatibility/2006" xmlns:p14="http://schemas.microsoft.com/office/powerpoint/2010/main" xmlns:aink="http://schemas.microsoft.com/office/drawing/2016/ink">
+          <mc:Choice Requires="p14 aink">
             <p:contentPart p14:bwMode="auto" r:id="rId18">
               <p14:nvContentPartPr>
                 <p14:cNvPr id="72" name="Ink 71">
@@ -10665,7 +10657,7 @@
               </p14:xfrm>
             </p:contentPart>
           </mc:Choice>
-          <mc:Fallback>
+          <mc:Fallback xmlns="">
             <p:pic>
               <p:nvPicPr>
                 <p:cNvPr id="72" name="Ink 71">
@@ -10696,8 +10688,8 @@
             </p:pic>
           </mc:Fallback>
         </mc:AlternateContent>
-        <mc:AlternateContent xmlns:mc="http://schemas.openxmlformats.org/markup-compatibility/2006">
-          <mc:Choice xmlns:p14="http://schemas.microsoft.com/office/powerpoint/2010/main" xmlns:aink="http://schemas.microsoft.com/office/drawing/2016/ink" Requires="p14 aink">
+        <mc:AlternateContent xmlns:mc="http://schemas.openxmlformats.org/markup-compatibility/2006" xmlns:p14="http://schemas.microsoft.com/office/powerpoint/2010/main" xmlns:aink="http://schemas.microsoft.com/office/drawing/2016/ink">
+          <mc:Choice Requires="p14 aink">
             <p:contentPart p14:bwMode="auto" r:id="rId20">
               <p14:nvContentPartPr>
                 <p14:cNvPr id="73" name="Ink 72">
@@ -10716,7 +10708,7 @@
               </p14:xfrm>
             </p:contentPart>
           </mc:Choice>
-          <mc:Fallback>
+          <mc:Fallback xmlns="">
             <p:pic>
               <p:nvPicPr>
                 <p:cNvPr id="73" name="Ink 72">
@@ -10914,8 +10906,8 @@
           </a:prstGeom>
         </p:spPr>
       </p:pic>
-      <mc:AlternateContent xmlns:mc="http://schemas.openxmlformats.org/markup-compatibility/2006">
-        <mc:Choice xmlns:p14="http://schemas.microsoft.com/office/powerpoint/2010/main" xmlns:aink="http://schemas.microsoft.com/office/drawing/2016/ink" Requires="p14 aink">
+      <mc:AlternateContent xmlns:mc="http://schemas.openxmlformats.org/markup-compatibility/2006" xmlns:p14="http://schemas.microsoft.com/office/powerpoint/2010/main" xmlns:aink="http://schemas.microsoft.com/office/drawing/2016/ink">
+        <mc:Choice Requires="p14 aink">
           <p:contentPart p14:bwMode="auto" r:id="rId28">
             <p14:nvContentPartPr>
               <p14:cNvPr id="81" name="Ink 80">
@@ -10934,7 +10926,7 @@
             </p14:xfrm>
           </p:contentPart>
         </mc:Choice>
-        <mc:Fallback>
+        <mc:Fallback xmlns="">
           <p:pic>
             <p:nvPicPr>
               <p:cNvPr id="81" name="Ink 80">
@@ -10965,8 +10957,8 @@
           </p:pic>
         </mc:Fallback>
       </mc:AlternateContent>
-      <mc:AlternateContent xmlns:mc="http://schemas.openxmlformats.org/markup-compatibility/2006">
-        <mc:Choice xmlns:p14="http://schemas.microsoft.com/office/powerpoint/2010/main" xmlns:aink="http://schemas.microsoft.com/office/drawing/2016/ink" Requires="p14 aink">
+      <mc:AlternateContent xmlns:mc="http://schemas.openxmlformats.org/markup-compatibility/2006" xmlns:p14="http://schemas.microsoft.com/office/powerpoint/2010/main" xmlns:aink="http://schemas.microsoft.com/office/drawing/2016/ink">
+        <mc:Choice Requires="p14 aink">
           <p:contentPart p14:bwMode="auto" r:id="rId30">
             <p14:nvContentPartPr>
               <p14:cNvPr id="90" name="Ink 89">
@@ -10985,7 +10977,7 @@
             </p14:xfrm>
           </p:contentPart>
         </mc:Choice>
-        <mc:Fallback>
+        <mc:Fallback xmlns="">
           <p:pic>
             <p:nvPicPr>
               <p:cNvPr id="90" name="Ink 89">
@@ -11016,8 +11008,8 @@
           </p:pic>
         </mc:Fallback>
       </mc:AlternateContent>
-      <mc:AlternateContent xmlns:mc="http://schemas.openxmlformats.org/markup-compatibility/2006">
-        <mc:Choice xmlns:p14="http://schemas.microsoft.com/office/powerpoint/2010/main" xmlns:aink="http://schemas.microsoft.com/office/drawing/2016/ink" Requires="p14 aink">
+      <mc:AlternateContent xmlns:mc="http://schemas.openxmlformats.org/markup-compatibility/2006" xmlns:p14="http://schemas.microsoft.com/office/powerpoint/2010/main" xmlns:aink="http://schemas.microsoft.com/office/drawing/2016/ink">
+        <mc:Choice Requires="p14 aink">
           <p:contentPart p14:bwMode="auto" r:id="rId32">
             <p14:nvContentPartPr>
               <p14:cNvPr id="91" name="Ink 90">
@@ -11036,7 +11028,7 @@
             </p14:xfrm>
           </p:contentPart>
         </mc:Choice>
-        <mc:Fallback>
+        <mc:Fallback xmlns="">
           <p:pic>
             <p:nvPicPr>
               <p:cNvPr id="91" name="Ink 90">
@@ -11067,8 +11059,8 @@
           </p:pic>
         </mc:Fallback>
       </mc:AlternateContent>
-      <mc:AlternateContent xmlns:mc="http://schemas.openxmlformats.org/markup-compatibility/2006">
-        <mc:Choice xmlns:p14="http://schemas.microsoft.com/office/powerpoint/2010/main" xmlns:aink="http://schemas.microsoft.com/office/drawing/2016/ink" Requires="p14 aink">
+      <mc:AlternateContent xmlns:mc="http://schemas.openxmlformats.org/markup-compatibility/2006" xmlns:p14="http://schemas.microsoft.com/office/powerpoint/2010/main" xmlns:aink="http://schemas.microsoft.com/office/drawing/2016/ink">
+        <mc:Choice Requires="p14 aink">
           <p:contentPart p14:bwMode="auto" r:id="rId34">
             <p14:nvContentPartPr>
               <p14:cNvPr id="92" name="Ink 91">
@@ -11087,7 +11079,7 @@
             </p14:xfrm>
           </p:contentPart>
         </mc:Choice>
-        <mc:Fallback>
+        <mc:Fallback xmlns="">
           <p:pic>
             <p:nvPicPr>
               <p:cNvPr id="92" name="Ink 91">
@@ -11118,8 +11110,8 @@
           </p:pic>
         </mc:Fallback>
       </mc:AlternateContent>
-      <mc:AlternateContent xmlns:mc="http://schemas.openxmlformats.org/markup-compatibility/2006">
-        <mc:Choice xmlns:p14="http://schemas.microsoft.com/office/powerpoint/2010/main" xmlns:aink="http://schemas.microsoft.com/office/drawing/2016/ink" Requires="p14 aink">
+      <mc:AlternateContent xmlns:mc="http://schemas.openxmlformats.org/markup-compatibility/2006" xmlns:p14="http://schemas.microsoft.com/office/powerpoint/2010/main" xmlns:aink="http://schemas.microsoft.com/office/drawing/2016/ink">
+        <mc:Choice Requires="p14 aink">
           <p:contentPart p14:bwMode="auto" r:id="rId36">
             <p14:nvContentPartPr>
               <p14:cNvPr id="93" name="Ink 92">
@@ -11138,7 +11130,7 @@
             </p14:xfrm>
           </p:contentPart>
         </mc:Choice>
-        <mc:Fallback>
+        <mc:Fallback xmlns="">
           <p:pic>
             <p:nvPicPr>
               <p:cNvPr id="93" name="Ink 92">
@@ -11169,8 +11161,8 @@
           </p:pic>
         </mc:Fallback>
       </mc:AlternateContent>
-      <mc:AlternateContent xmlns:mc="http://schemas.openxmlformats.org/markup-compatibility/2006">
-        <mc:Choice xmlns:p14="http://schemas.microsoft.com/office/powerpoint/2010/main" xmlns:aink="http://schemas.microsoft.com/office/drawing/2016/ink" Requires="p14 aink">
+      <mc:AlternateContent xmlns:mc="http://schemas.openxmlformats.org/markup-compatibility/2006" xmlns:p14="http://schemas.microsoft.com/office/powerpoint/2010/main" xmlns:aink="http://schemas.microsoft.com/office/drawing/2016/ink">
+        <mc:Choice Requires="p14 aink">
           <p:contentPart p14:bwMode="auto" r:id="rId38">
             <p14:nvContentPartPr>
               <p14:cNvPr id="94" name="Ink 93">
@@ -11189,7 +11181,7 @@
             </p14:xfrm>
           </p:contentPart>
         </mc:Choice>
-        <mc:Fallback>
+        <mc:Fallback xmlns="">
           <p:pic>
             <p:nvPicPr>
               <p:cNvPr id="94" name="Ink 93">
@@ -11220,8 +11212,8 @@
           </p:pic>
         </mc:Fallback>
       </mc:AlternateContent>
-      <mc:AlternateContent xmlns:mc="http://schemas.openxmlformats.org/markup-compatibility/2006">
-        <mc:Choice xmlns:p14="http://schemas.microsoft.com/office/powerpoint/2010/main" xmlns:aink="http://schemas.microsoft.com/office/drawing/2016/ink" Requires="p14 aink">
+      <mc:AlternateContent xmlns:mc="http://schemas.openxmlformats.org/markup-compatibility/2006" xmlns:p14="http://schemas.microsoft.com/office/powerpoint/2010/main" xmlns:aink="http://schemas.microsoft.com/office/drawing/2016/ink">
+        <mc:Choice Requires="p14 aink">
           <p:contentPart p14:bwMode="auto" r:id="rId40">
             <p14:nvContentPartPr>
               <p14:cNvPr id="95" name="Ink 94">
@@ -11240,7 +11232,7 @@
             </p14:xfrm>
           </p:contentPart>
         </mc:Choice>
-        <mc:Fallback>
+        <mc:Fallback xmlns="">
           <p:pic>
             <p:nvPicPr>
               <p:cNvPr id="95" name="Ink 94">
@@ -11271,8 +11263,8 @@
           </p:pic>
         </mc:Fallback>
       </mc:AlternateContent>
-      <mc:AlternateContent xmlns:mc="http://schemas.openxmlformats.org/markup-compatibility/2006">
-        <mc:Choice xmlns:p14="http://schemas.microsoft.com/office/powerpoint/2010/main" xmlns:aink="http://schemas.microsoft.com/office/drawing/2016/ink" Requires="p14 aink">
+      <mc:AlternateContent xmlns:mc="http://schemas.openxmlformats.org/markup-compatibility/2006" xmlns:p14="http://schemas.microsoft.com/office/powerpoint/2010/main" xmlns:aink="http://schemas.microsoft.com/office/drawing/2016/ink">
+        <mc:Choice Requires="p14 aink">
           <p:contentPart p14:bwMode="auto" r:id="rId42">
             <p14:nvContentPartPr>
               <p14:cNvPr id="96" name="Ink 95">
@@ -11291,7 +11283,7 @@
             </p14:xfrm>
           </p:contentPart>
         </mc:Choice>
-        <mc:Fallback>
+        <mc:Fallback xmlns="">
           <p:pic>
             <p:nvPicPr>
               <p:cNvPr id="96" name="Ink 95">
@@ -11322,8 +11314,8 @@
           </p:pic>
         </mc:Fallback>
       </mc:AlternateContent>
-      <mc:AlternateContent xmlns:mc="http://schemas.openxmlformats.org/markup-compatibility/2006">
-        <mc:Choice xmlns:p14="http://schemas.microsoft.com/office/powerpoint/2010/main" xmlns:aink="http://schemas.microsoft.com/office/drawing/2016/ink" Requires="p14 aink">
+      <mc:AlternateContent xmlns:mc="http://schemas.openxmlformats.org/markup-compatibility/2006" xmlns:p14="http://schemas.microsoft.com/office/powerpoint/2010/main" xmlns:aink="http://schemas.microsoft.com/office/drawing/2016/ink">
+        <mc:Choice Requires="p14 aink">
           <p:contentPart p14:bwMode="auto" r:id="rId44">
             <p14:nvContentPartPr>
               <p14:cNvPr id="97" name="Ink 96">
@@ -11342,7 +11334,7 @@
             </p14:xfrm>
           </p:contentPart>
         </mc:Choice>
-        <mc:Fallback>
+        <mc:Fallback xmlns="">
           <p:pic>
             <p:nvPicPr>
               <p:cNvPr id="97" name="Ink 96">
@@ -11393,8 +11385,8 @@
             <a:chExt cx="375120" cy="466920"/>
           </a:xfrm>
         </p:grpSpPr>
-        <mc:AlternateContent xmlns:mc="http://schemas.openxmlformats.org/markup-compatibility/2006">
-          <mc:Choice xmlns:p14="http://schemas.microsoft.com/office/powerpoint/2010/main" xmlns:aink="http://schemas.microsoft.com/office/drawing/2016/ink" Requires="p14 aink">
+        <mc:AlternateContent xmlns:mc="http://schemas.openxmlformats.org/markup-compatibility/2006" xmlns:p14="http://schemas.microsoft.com/office/powerpoint/2010/main" xmlns:aink="http://schemas.microsoft.com/office/drawing/2016/ink">
+          <mc:Choice Requires="p14 aink">
             <p:contentPart p14:bwMode="auto" r:id="rId46">
               <p14:nvContentPartPr>
                 <p14:cNvPr id="104" name="Ink 103">
@@ -11413,7 +11405,7 @@
               </p14:xfrm>
             </p:contentPart>
           </mc:Choice>
-          <mc:Fallback>
+          <mc:Fallback xmlns="">
             <p:pic>
               <p:nvPicPr>
                 <p:cNvPr id="104" name="Ink 103">
@@ -11444,8 +11436,8 @@
             </p:pic>
           </mc:Fallback>
         </mc:AlternateContent>
-        <mc:AlternateContent xmlns:mc="http://schemas.openxmlformats.org/markup-compatibility/2006">
-          <mc:Choice xmlns:p14="http://schemas.microsoft.com/office/powerpoint/2010/main" xmlns:aink="http://schemas.microsoft.com/office/drawing/2016/ink" Requires="p14 aink">
+        <mc:AlternateContent xmlns:mc="http://schemas.openxmlformats.org/markup-compatibility/2006" xmlns:p14="http://schemas.microsoft.com/office/powerpoint/2010/main" xmlns:aink="http://schemas.microsoft.com/office/drawing/2016/ink">
+          <mc:Choice Requires="p14 aink">
             <p:contentPart p14:bwMode="auto" r:id="rId48">
               <p14:nvContentPartPr>
                 <p14:cNvPr id="105" name="Ink 104">
@@ -11464,7 +11456,7 @@
               </p14:xfrm>
             </p:contentPart>
           </mc:Choice>
-          <mc:Fallback>
+          <mc:Fallback xmlns="">
             <p:pic>
               <p:nvPicPr>
                 <p:cNvPr id="105" name="Ink 104">
@@ -11495,8 +11487,8 @@
             </p:pic>
           </mc:Fallback>
         </mc:AlternateContent>
-        <mc:AlternateContent xmlns:mc="http://schemas.openxmlformats.org/markup-compatibility/2006">
-          <mc:Choice xmlns:p14="http://schemas.microsoft.com/office/powerpoint/2010/main" xmlns:aink="http://schemas.microsoft.com/office/drawing/2016/ink" Requires="p14 aink">
+        <mc:AlternateContent xmlns:mc="http://schemas.openxmlformats.org/markup-compatibility/2006" xmlns:p14="http://schemas.microsoft.com/office/powerpoint/2010/main" xmlns:aink="http://schemas.microsoft.com/office/drawing/2016/ink">
+          <mc:Choice Requires="p14 aink">
             <p:contentPart p14:bwMode="auto" r:id="rId50">
               <p14:nvContentPartPr>
                 <p14:cNvPr id="106" name="Ink 105">
@@ -11515,7 +11507,7 @@
               </p14:xfrm>
             </p:contentPart>
           </mc:Choice>
-          <mc:Fallback>
+          <mc:Fallback xmlns="">
             <p:pic>
               <p:nvPicPr>
                 <p:cNvPr id="106" name="Ink 105">
@@ -11567,8 +11559,8 @@
             <a:chExt cx="2844052" cy="5399179"/>
           </a:xfrm>
         </p:grpSpPr>
-        <mc:AlternateContent xmlns:mc="http://schemas.openxmlformats.org/markup-compatibility/2006">
-          <mc:Choice xmlns:p14="http://schemas.microsoft.com/office/powerpoint/2010/main" xmlns:aink="http://schemas.microsoft.com/office/drawing/2016/ink" Requires="p14 aink">
+        <mc:AlternateContent xmlns:mc="http://schemas.openxmlformats.org/markup-compatibility/2006" xmlns:p14="http://schemas.microsoft.com/office/powerpoint/2010/main" xmlns:aink="http://schemas.microsoft.com/office/drawing/2016/ink">
+          <mc:Choice Requires="p14 aink">
             <p:contentPart p14:bwMode="auto" r:id="rId52">
               <p14:nvContentPartPr>
                 <p14:cNvPr id="109" name="Ink 108">
@@ -11587,7 +11579,7 @@
               </p14:xfrm>
             </p:contentPart>
           </mc:Choice>
-          <mc:Fallback>
+          <mc:Fallback xmlns="">
             <p:pic>
               <p:nvPicPr>
                 <p:cNvPr id="109" name="Ink 108">
@@ -11618,8 +11610,8 @@
             </p:pic>
           </mc:Fallback>
         </mc:AlternateContent>
-        <mc:AlternateContent xmlns:mc="http://schemas.openxmlformats.org/markup-compatibility/2006">
-          <mc:Choice xmlns:p14="http://schemas.microsoft.com/office/powerpoint/2010/main" xmlns:aink="http://schemas.microsoft.com/office/drawing/2016/ink" Requires="p14 aink">
+        <mc:AlternateContent xmlns:mc="http://schemas.openxmlformats.org/markup-compatibility/2006" xmlns:p14="http://schemas.microsoft.com/office/powerpoint/2010/main" xmlns:aink="http://schemas.microsoft.com/office/drawing/2016/ink">
+          <mc:Choice Requires="p14 aink">
             <p:contentPart p14:bwMode="auto" r:id="rId54">
               <p14:nvContentPartPr>
                 <p14:cNvPr id="110" name="Ink 109">
@@ -11638,7 +11630,7 @@
               </p14:xfrm>
             </p:contentPart>
           </mc:Choice>
-          <mc:Fallback>
+          <mc:Fallback xmlns="">
             <p:pic>
               <p:nvPicPr>
                 <p:cNvPr id="110" name="Ink 109">
@@ -11669,8 +11661,8 @@
             </p:pic>
           </mc:Fallback>
         </mc:AlternateContent>
-        <mc:AlternateContent xmlns:mc="http://schemas.openxmlformats.org/markup-compatibility/2006">
-          <mc:Choice xmlns:p14="http://schemas.microsoft.com/office/powerpoint/2010/main" xmlns:aink="http://schemas.microsoft.com/office/drawing/2016/ink" Requires="p14 aink">
+        <mc:AlternateContent xmlns:mc="http://schemas.openxmlformats.org/markup-compatibility/2006" xmlns:p14="http://schemas.microsoft.com/office/powerpoint/2010/main" xmlns:aink="http://schemas.microsoft.com/office/drawing/2016/ink">
+          <mc:Choice Requires="p14 aink">
             <p:contentPart p14:bwMode="auto" r:id="rId56">
               <p14:nvContentPartPr>
                 <p14:cNvPr id="111" name="Ink 110">
@@ -11689,7 +11681,7 @@
               </p14:xfrm>
             </p:contentPart>
           </mc:Choice>
-          <mc:Fallback>
+          <mc:Fallback xmlns="">
             <p:pic>
               <p:nvPicPr>
                 <p:cNvPr id="111" name="Ink 110">
@@ -11720,8 +11712,8 @@
             </p:pic>
           </mc:Fallback>
         </mc:AlternateContent>
-        <mc:AlternateContent xmlns:mc="http://schemas.openxmlformats.org/markup-compatibility/2006">
-          <mc:Choice xmlns:p14="http://schemas.microsoft.com/office/powerpoint/2010/main" xmlns:aink="http://schemas.microsoft.com/office/drawing/2016/ink" Requires="p14 aink">
+        <mc:AlternateContent xmlns:mc="http://schemas.openxmlformats.org/markup-compatibility/2006" xmlns:p14="http://schemas.microsoft.com/office/powerpoint/2010/main" xmlns:aink="http://schemas.microsoft.com/office/drawing/2016/ink">
+          <mc:Choice Requires="p14 aink">
             <p:contentPart p14:bwMode="auto" r:id="rId58">
               <p14:nvContentPartPr>
                 <p14:cNvPr id="112" name="Ink 111">
@@ -11740,7 +11732,7 @@
               </p14:xfrm>
             </p:contentPart>
           </mc:Choice>
-          <mc:Fallback>
+          <mc:Fallback xmlns="">
             <p:pic>
               <p:nvPicPr>
                 <p:cNvPr id="112" name="Ink 111">
@@ -11771,8 +11763,8 @@
             </p:pic>
           </mc:Fallback>
         </mc:AlternateContent>
-        <mc:AlternateContent xmlns:mc="http://schemas.openxmlformats.org/markup-compatibility/2006">
-          <mc:Choice xmlns:p14="http://schemas.microsoft.com/office/powerpoint/2010/main" xmlns:aink="http://schemas.microsoft.com/office/drawing/2016/ink" Requires="p14 aink">
+        <mc:AlternateContent xmlns:mc="http://schemas.openxmlformats.org/markup-compatibility/2006" xmlns:p14="http://schemas.microsoft.com/office/powerpoint/2010/main" xmlns:aink="http://schemas.microsoft.com/office/drawing/2016/ink">
+          <mc:Choice Requires="p14 aink">
             <p:contentPart p14:bwMode="auto" r:id="rId60">
               <p14:nvContentPartPr>
                 <p14:cNvPr id="113" name="Ink 112">
@@ -11791,7 +11783,7 @@
               </p14:xfrm>
             </p:contentPart>
           </mc:Choice>
-          <mc:Fallback>
+          <mc:Fallback xmlns="">
             <p:pic>
               <p:nvPicPr>
                 <p:cNvPr id="113" name="Ink 112">
@@ -11822,8 +11814,8 @@
             </p:pic>
           </mc:Fallback>
         </mc:AlternateContent>
-        <mc:AlternateContent xmlns:mc="http://schemas.openxmlformats.org/markup-compatibility/2006">
-          <mc:Choice xmlns:p14="http://schemas.microsoft.com/office/powerpoint/2010/main" xmlns:aink="http://schemas.microsoft.com/office/drawing/2016/ink" Requires="p14 aink">
+        <mc:AlternateContent xmlns:mc="http://schemas.openxmlformats.org/markup-compatibility/2006" xmlns:p14="http://schemas.microsoft.com/office/powerpoint/2010/main" xmlns:aink="http://schemas.microsoft.com/office/drawing/2016/ink">
+          <mc:Choice Requires="p14 aink">
             <p:contentPart p14:bwMode="auto" r:id="rId62">
               <p14:nvContentPartPr>
                 <p14:cNvPr id="114" name="Ink 113">
@@ -11842,7 +11834,7 @@
               </p14:xfrm>
             </p:contentPart>
           </mc:Choice>
-          <mc:Fallback>
+          <mc:Fallback xmlns="">
             <p:pic>
               <p:nvPicPr>
                 <p:cNvPr id="114" name="Ink 113">
@@ -11873,8 +11865,8 @@
             </p:pic>
           </mc:Fallback>
         </mc:AlternateContent>
-        <mc:AlternateContent xmlns:mc="http://schemas.openxmlformats.org/markup-compatibility/2006">
-          <mc:Choice xmlns:p14="http://schemas.microsoft.com/office/powerpoint/2010/main" xmlns:aink="http://schemas.microsoft.com/office/drawing/2016/ink" Requires="p14 aink">
+        <mc:AlternateContent xmlns:mc="http://schemas.openxmlformats.org/markup-compatibility/2006" xmlns:p14="http://schemas.microsoft.com/office/powerpoint/2010/main" xmlns:aink="http://schemas.microsoft.com/office/drawing/2016/ink">
+          <mc:Choice Requires="p14 aink">
             <p:contentPart p14:bwMode="auto" r:id="rId64">
               <p14:nvContentPartPr>
                 <p14:cNvPr id="115" name="Ink 114">
@@ -11893,7 +11885,7 @@
               </p14:xfrm>
             </p:contentPart>
           </mc:Choice>
-          <mc:Fallback>
+          <mc:Fallback xmlns="">
             <p:pic>
               <p:nvPicPr>
                 <p:cNvPr id="115" name="Ink 114">
@@ -11924,8 +11916,8 @@
             </p:pic>
           </mc:Fallback>
         </mc:AlternateContent>
-        <mc:AlternateContent xmlns:mc="http://schemas.openxmlformats.org/markup-compatibility/2006">
-          <mc:Choice xmlns:p14="http://schemas.microsoft.com/office/powerpoint/2010/main" xmlns:aink="http://schemas.microsoft.com/office/drawing/2016/ink" Requires="p14 aink">
+        <mc:AlternateContent xmlns:mc="http://schemas.openxmlformats.org/markup-compatibility/2006" xmlns:p14="http://schemas.microsoft.com/office/powerpoint/2010/main" xmlns:aink="http://schemas.microsoft.com/office/drawing/2016/ink">
+          <mc:Choice Requires="p14 aink">
             <p:contentPart p14:bwMode="auto" r:id="rId66">
               <p14:nvContentPartPr>
                 <p14:cNvPr id="116" name="Ink 115">
@@ -11944,7 +11936,7 @@
               </p14:xfrm>
             </p:contentPart>
           </mc:Choice>
-          <mc:Fallback>
+          <mc:Fallback xmlns="">
             <p:pic>
               <p:nvPicPr>
                 <p:cNvPr id="116" name="Ink 115">
@@ -11975,8 +11967,8 @@
             </p:pic>
           </mc:Fallback>
         </mc:AlternateContent>
-        <mc:AlternateContent xmlns:mc="http://schemas.openxmlformats.org/markup-compatibility/2006">
-          <mc:Choice xmlns:p14="http://schemas.microsoft.com/office/powerpoint/2010/main" xmlns:aink="http://schemas.microsoft.com/office/drawing/2016/ink" Requires="p14 aink">
+        <mc:AlternateContent xmlns:mc="http://schemas.openxmlformats.org/markup-compatibility/2006" xmlns:p14="http://schemas.microsoft.com/office/powerpoint/2010/main" xmlns:aink="http://schemas.microsoft.com/office/drawing/2016/ink">
+          <mc:Choice Requires="p14 aink">
             <p:contentPart p14:bwMode="auto" r:id="rId68">
               <p14:nvContentPartPr>
                 <p14:cNvPr id="117" name="Ink 116">
@@ -11995,7 +11987,7 @@
               </p14:xfrm>
             </p:contentPart>
           </mc:Choice>
-          <mc:Fallback>
+          <mc:Fallback xmlns="">
             <p:pic>
               <p:nvPicPr>
                 <p:cNvPr id="117" name="Ink 116">
@@ -12026,8 +12018,8 @@
             </p:pic>
           </mc:Fallback>
         </mc:AlternateContent>
-        <mc:AlternateContent xmlns:mc="http://schemas.openxmlformats.org/markup-compatibility/2006">
-          <mc:Choice xmlns:p14="http://schemas.microsoft.com/office/powerpoint/2010/main" xmlns:aink="http://schemas.microsoft.com/office/drawing/2016/ink" Requires="p14 aink">
+        <mc:AlternateContent xmlns:mc="http://schemas.openxmlformats.org/markup-compatibility/2006" xmlns:p14="http://schemas.microsoft.com/office/powerpoint/2010/main" xmlns:aink="http://schemas.microsoft.com/office/drawing/2016/ink">
+          <mc:Choice Requires="p14 aink">
             <p:contentPart p14:bwMode="auto" r:id="rId70">
               <p14:nvContentPartPr>
                 <p14:cNvPr id="118" name="Ink 117">
@@ -12046,7 +12038,7 @@
               </p14:xfrm>
             </p:contentPart>
           </mc:Choice>
-          <mc:Fallback>
+          <mc:Fallback xmlns="">
             <p:pic>
               <p:nvPicPr>
                 <p:cNvPr id="118" name="Ink 117">
@@ -12077,8 +12069,8 @@
             </p:pic>
           </mc:Fallback>
         </mc:AlternateContent>
-        <mc:AlternateContent xmlns:mc="http://schemas.openxmlformats.org/markup-compatibility/2006">
-          <mc:Choice xmlns:p14="http://schemas.microsoft.com/office/powerpoint/2010/main" xmlns:aink="http://schemas.microsoft.com/office/drawing/2016/ink" Requires="p14 aink">
+        <mc:AlternateContent xmlns:mc="http://schemas.openxmlformats.org/markup-compatibility/2006" xmlns:p14="http://schemas.microsoft.com/office/powerpoint/2010/main" xmlns:aink="http://schemas.microsoft.com/office/drawing/2016/ink">
+          <mc:Choice Requires="p14 aink">
             <p:contentPart p14:bwMode="auto" r:id="rId72">
               <p14:nvContentPartPr>
                 <p14:cNvPr id="119" name="Ink 118">
@@ -12097,7 +12089,7 @@
               </p14:xfrm>
             </p:contentPart>
           </mc:Choice>
-          <mc:Fallback>
+          <mc:Fallback xmlns="">
             <p:pic>
               <p:nvPicPr>
                 <p:cNvPr id="119" name="Ink 118">
@@ -12128,8 +12120,8 @@
             </p:pic>
           </mc:Fallback>
         </mc:AlternateContent>
-        <mc:AlternateContent xmlns:mc="http://schemas.openxmlformats.org/markup-compatibility/2006">
-          <mc:Choice xmlns:p14="http://schemas.microsoft.com/office/powerpoint/2010/main" xmlns:aink="http://schemas.microsoft.com/office/drawing/2016/ink" Requires="p14 aink">
+        <mc:AlternateContent xmlns:mc="http://schemas.openxmlformats.org/markup-compatibility/2006" xmlns:p14="http://schemas.microsoft.com/office/powerpoint/2010/main" xmlns:aink="http://schemas.microsoft.com/office/drawing/2016/ink">
+          <mc:Choice Requires="p14 aink">
             <p:contentPart p14:bwMode="auto" r:id="rId74">
               <p14:nvContentPartPr>
                 <p14:cNvPr id="120" name="Ink 119">
@@ -12148,7 +12140,7 @@
               </p14:xfrm>
             </p:contentPart>
           </mc:Choice>
-          <mc:Fallback>
+          <mc:Fallback xmlns="">
             <p:pic>
               <p:nvPicPr>
                 <p:cNvPr id="120" name="Ink 119">
@@ -12179,8 +12171,8 @@
             </p:pic>
           </mc:Fallback>
         </mc:AlternateContent>
-        <mc:AlternateContent xmlns:mc="http://schemas.openxmlformats.org/markup-compatibility/2006">
-          <mc:Choice xmlns:p14="http://schemas.microsoft.com/office/powerpoint/2010/main" xmlns:aink="http://schemas.microsoft.com/office/drawing/2016/ink" Requires="p14 aink">
+        <mc:AlternateContent xmlns:mc="http://schemas.openxmlformats.org/markup-compatibility/2006" xmlns:p14="http://schemas.microsoft.com/office/powerpoint/2010/main" xmlns:aink="http://schemas.microsoft.com/office/drawing/2016/ink">
+          <mc:Choice Requires="p14 aink">
             <p:contentPart p14:bwMode="auto" r:id="rId76">
               <p14:nvContentPartPr>
                 <p14:cNvPr id="121" name="Ink 120">
@@ -12199,7 +12191,7 @@
               </p14:xfrm>
             </p:contentPart>
           </mc:Choice>
-          <mc:Fallback>
+          <mc:Fallback xmlns="">
             <p:pic>
               <p:nvPicPr>
                 <p:cNvPr id="121" name="Ink 120">
@@ -12230,8 +12222,8 @@
             </p:pic>
           </mc:Fallback>
         </mc:AlternateContent>
-        <mc:AlternateContent xmlns:mc="http://schemas.openxmlformats.org/markup-compatibility/2006">
-          <mc:Choice xmlns:p14="http://schemas.microsoft.com/office/powerpoint/2010/main" xmlns:aink="http://schemas.microsoft.com/office/drawing/2016/ink" Requires="p14 aink">
+        <mc:AlternateContent xmlns:mc="http://schemas.openxmlformats.org/markup-compatibility/2006" xmlns:p14="http://schemas.microsoft.com/office/powerpoint/2010/main" xmlns:aink="http://schemas.microsoft.com/office/drawing/2016/ink">
+          <mc:Choice Requires="p14 aink">
             <p:contentPart p14:bwMode="auto" r:id="rId78">
               <p14:nvContentPartPr>
                 <p14:cNvPr id="122" name="Ink 121">
@@ -12250,7 +12242,7 @@
               </p14:xfrm>
             </p:contentPart>
           </mc:Choice>
-          <mc:Fallback>
+          <mc:Fallback xmlns="">
             <p:pic>
               <p:nvPicPr>
                 <p:cNvPr id="122" name="Ink 121">
@@ -12405,7 +12397,7 @@
         </p:blipFill>
         <p:spPr bwMode="auto">
           <a:xfrm>
-            <a:off x="4894500" y="4901410"/>
+            <a:off x="4922506" y="4976650"/>
             <a:ext cx="1371600" cy="1083564"/>
           </a:xfrm>
           <a:prstGeom prst="rect">
@@ -12452,7 +12444,7 @@
         </p:blipFill>
         <p:spPr bwMode="auto">
           <a:xfrm>
-            <a:off x="6243063" y="3429000"/>
+            <a:off x="6271069" y="3504240"/>
             <a:ext cx="1371600" cy="1332429"/>
           </a:xfrm>
           <a:prstGeom prst="rect">
@@ -12508,7 +12500,7 @@
         </p:blipFill>
         <p:spPr bwMode="auto">
           <a:xfrm>
-            <a:off x="4322460" y="2495643"/>
+            <a:off x="4350466" y="2570883"/>
             <a:ext cx="1371600" cy="1371600"/>
           </a:xfrm>
           <a:prstGeom prst="rect">
@@ -12542,8 +12534,8 @@
             <a:chExt cx="435960" cy="659160"/>
           </a:xfrm>
         </p:grpSpPr>
-        <mc:AlternateContent xmlns:mc="http://schemas.openxmlformats.org/markup-compatibility/2006">
-          <mc:Choice xmlns:p14="http://schemas.microsoft.com/office/powerpoint/2010/main" xmlns:aink="http://schemas.microsoft.com/office/drawing/2016/ink" Requires="p14 aink">
+        <mc:AlternateContent xmlns:mc="http://schemas.openxmlformats.org/markup-compatibility/2006" xmlns:p14="http://schemas.microsoft.com/office/powerpoint/2010/main" xmlns:aink="http://schemas.microsoft.com/office/drawing/2016/ink">
+          <mc:Choice Requires="p14 aink">
             <p:contentPart p14:bwMode="auto" r:id="rId86">
               <p14:nvContentPartPr>
                 <p14:cNvPr id="156" name="Ink 155">
@@ -12562,7 +12554,7 @@
               </p14:xfrm>
             </p:contentPart>
           </mc:Choice>
-          <mc:Fallback>
+          <mc:Fallback xmlns="">
             <p:pic>
               <p:nvPicPr>
                 <p:cNvPr id="156" name="Ink 155">
@@ -12593,8 +12585,8 @@
             </p:pic>
           </mc:Fallback>
         </mc:AlternateContent>
-        <mc:AlternateContent xmlns:mc="http://schemas.openxmlformats.org/markup-compatibility/2006">
-          <mc:Choice xmlns:p14="http://schemas.microsoft.com/office/powerpoint/2010/main" xmlns:aink="http://schemas.microsoft.com/office/drawing/2016/ink" Requires="p14 aink">
+        <mc:AlternateContent xmlns:mc="http://schemas.openxmlformats.org/markup-compatibility/2006" xmlns:p14="http://schemas.microsoft.com/office/powerpoint/2010/main" xmlns:aink="http://schemas.microsoft.com/office/drawing/2016/ink">
+          <mc:Choice Requires="p14 aink">
             <p:contentPart p14:bwMode="auto" r:id="rId88">
               <p14:nvContentPartPr>
                 <p14:cNvPr id="157" name="Ink 156">
@@ -12613,7 +12605,7 @@
               </p14:xfrm>
             </p:contentPart>
           </mc:Choice>
-          <mc:Fallback>
+          <mc:Fallback xmlns="">
             <p:pic>
               <p:nvPicPr>
                 <p:cNvPr id="157" name="Ink 156">
@@ -12665,8 +12657,8 @@
             <a:chExt cx="243360" cy="649080"/>
           </a:xfrm>
         </p:grpSpPr>
-        <mc:AlternateContent xmlns:mc="http://schemas.openxmlformats.org/markup-compatibility/2006">
-          <mc:Choice xmlns:p14="http://schemas.microsoft.com/office/powerpoint/2010/main" xmlns:aink="http://schemas.microsoft.com/office/drawing/2016/ink" Requires="p14 aink">
+        <mc:AlternateContent xmlns:mc="http://schemas.openxmlformats.org/markup-compatibility/2006" xmlns:p14="http://schemas.microsoft.com/office/powerpoint/2010/main" xmlns:aink="http://schemas.microsoft.com/office/drawing/2016/ink">
+          <mc:Choice Requires="p14 aink">
             <p:contentPart p14:bwMode="auto" r:id="rId90">
               <p14:nvContentPartPr>
                 <p14:cNvPr id="158" name="Ink 157">
@@ -12685,7 +12677,7 @@
               </p14:xfrm>
             </p:contentPart>
           </mc:Choice>
-          <mc:Fallback>
+          <mc:Fallback xmlns="">
             <p:pic>
               <p:nvPicPr>
                 <p:cNvPr id="158" name="Ink 157">
@@ -12716,8 +12708,8 @@
             </p:pic>
           </mc:Fallback>
         </mc:AlternateContent>
-        <mc:AlternateContent xmlns:mc="http://schemas.openxmlformats.org/markup-compatibility/2006">
-          <mc:Choice xmlns:p14="http://schemas.microsoft.com/office/powerpoint/2010/main" xmlns:aink="http://schemas.microsoft.com/office/drawing/2016/ink" Requires="p14 aink">
+        <mc:AlternateContent xmlns:mc="http://schemas.openxmlformats.org/markup-compatibility/2006" xmlns:p14="http://schemas.microsoft.com/office/powerpoint/2010/main" xmlns:aink="http://schemas.microsoft.com/office/drawing/2016/ink">
+          <mc:Choice Requires="p14 aink">
             <p:contentPart p14:bwMode="auto" r:id="rId92">
               <p14:nvContentPartPr>
                 <p14:cNvPr id="159" name="Ink 158">
@@ -12736,7 +12728,7 @@
               </p14:xfrm>
             </p:contentPart>
           </mc:Choice>
-          <mc:Fallback>
+          <mc:Fallback xmlns="">
             <p:pic>
               <p:nvPicPr>
                 <p:cNvPr id="159" name="Ink 158">
@@ -12782,14 +12774,14 @@
         </p:nvGrpSpPr>
         <p:grpSpPr>
           <a:xfrm>
-            <a:off x="3982944" y="2053648"/>
+            <a:off x="4010950" y="2128888"/>
             <a:ext cx="4067640" cy="4347720"/>
             <a:chOff x="3982944" y="2053648"/>
             <a:chExt cx="4067640" cy="4347720"/>
           </a:xfrm>
         </p:grpSpPr>
-        <mc:AlternateContent xmlns:mc="http://schemas.openxmlformats.org/markup-compatibility/2006">
-          <mc:Choice xmlns:p14="http://schemas.microsoft.com/office/powerpoint/2010/main" xmlns:aink="http://schemas.microsoft.com/office/drawing/2016/ink" Requires="p14 aink">
+        <mc:AlternateContent xmlns:mc="http://schemas.openxmlformats.org/markup-compatibility/2006" xmlns:p14="http://schemas.microsoft.com/office/powerpoint/2010/main" xmlns:aink="http://schemas.microsoft.com/office/drawing/2016/ink">
+          <mc:Choice Requires="p14 aink">
             <p:contentPart p14:bwMode="auto" r:id="rId94">
               <p14:nvContentPartPr>
                 <p14:cNvPr id="164" name="Ink 163">
@@ -12808,7 +12800,7 @@
               </p14:xfrm>
             </p:contentPart>
           </mc:Choice>
-          <mc:Fallback>
+          <mc:Fallback xmlns="">
             <p:pic>
               <p:nvPicPr>
                 <p:cNvPr id="164" name="Ink 163">
@@ -12839,8 +12831,8 @@
             </p:pic>
           </mc:Fallback>
         </mc:AlternateContent>
-        <mc:AlternateContent xmlns:mc="http://schemas.openxmlformats.org/markup-compatibility/2006">
-          <mc:Choice xmlns:p14="http://schemas.microsoft.com/office/powerpoint/2010/main" xmlns:aink="http://schemas.microsoft.com/office/drawing/2016/ink" Requires="p14 aink">
+        <mc:AlternateContent xmlns:mc="http://schemas.openxmlformats.org/markup-compatibility/2006" xmlns:p14="http://schemas.microsoft.com/office/powerpoint/2010/main" xmlns:aink="http://schemas.microsoft.com/office/drawing/2016/ink">
+          <mc:Choice Requires="p14 aink">
             <p:contentPart p14:bwMode="auto" r:id="rId96">
               <p14:nvContentPartPr>
                 <p14:cNvPr id="165" name="Ink 164">
@@ -12859,7 +12851,7 @@
               </p14:xfrm>
             </p:contentPart>
           </mc:Choice>
-          <mc:Fallback>
+          <mc:Fallback xmlns="">
             <p:pic>
               <p:nvPicPr>
                 <p:cNvPr id="165" name="Ink 164">
@@ -12890,8 +12882,8 @@
             </p:pic>
           </mc:Fallback>
         </mc:AlternateContent>
-        <mc:AlternateContent xmlns:mc="http://schemas.openxmlformats.org/markup-compatibility/2006">
-          <mc:Choice xmlns:p14="http://schemas.microsoft.com/office/powerpoint/2010/main" xmlns:aink="http://schemas.microsoft.com/office/drawing/2016/ink" Requires="p14 aink">
+        <mc:AlternateContent xmlns:mc="http://schemas.openxmlformats.org/markup-compatibility/2006" xmlns:p14="http://schemas.microsoft.com/office/powerpoint/2010/main" xmlns:aink="http://schemas.microsoft.com/office/drawing/2016/ink">
+          <mc:Choice Requires="p14 aink">
             <p:contentPart p14:bwMode="auto" r:id="rId98">
               <p14:nvContentPartPr>
                 <p14:cNvPr id="168" name="Ink 167">
@@ -12910,7 +12902,7 @@
               </p14:xfrm>
             </p:contentPart>
           </mc:Choice>
-          <mc:Fallback>
+          <mc:Fallback xmlns="">
             <p:pic>
               <p:nvPicPr>
                 <p:cNvPr id="168" name="Ink 167">
@@ -12941,8 +12933,8 @@
             </p:pic>
           </mc:Fallback>
         </mc:AlternateContent>
-        <mc:AlternateContent xmlns:mc="http://schemas.openxmlformats.org/markup-compatibility/2006">
-          <mc:Choice xmlns:p14="http://schemas.microsoft.com/office/powerpoint/2010/main" xmlns:aink="http://schemas.microsoft.com/office/drawing/2016/ink" Requires="p14 aink">
+        <mc:AlternateContent xmlns:mc="http://schemas.openxmlformats.org/markup-compatibility/2006" xmlns:p14="http://schemas.microsoft.com/office/powerpoint/2010/main" xmlns:aink="http://schemas.microsoft.com/office/drawing/2016/ink">
+          <mc:Choice Requires="p14 aink">
             <p:contentPart p14:bwMode="auto" r:id="rId100">
               <p14:nvContentPartPr>
                 <p14:cNvPr id="173" name="Ink 172">
@@ -12961,7 +12953,7 @@
               </p14:xfrm>
             </p:contentPart>
           </mc:Choice>
-          <mc:Fallback>
+          <mc:Fallback xmlns="">
             <p:pic>
               <p:nvPicPr>
                 <p:cNvPr id="173" name="Ink 172">
@@ -12992,8 +12984,8 @@
             </p:pic>
           </mc:Fallback>
         </mc:AlternateContent>
-        <mc:AlternateContent xmlns:mc="http://schemas.openxmlformats.org/markup-compatibility/2006">
-          <mc:Choice xmlns:p14="http://schemas.microsoft.com/office/powerpoint/2010/main" xmlns:aink="http://schemas.microsoft.com/office/drawing/2016/ink" Requires="p14 aink">
+        <mc:AlternateContent xmlns:mc="http://schemas.openxmlformats.org/markup-compatibility/2006" xmlns:p14="http://schemas.microsoft.com/office/powerpoint/2010/main" xmlns:aink="http://schemas.microsoft.com/office/drawing/2016/ink">
+          <mc:Choice Requires="p14 aink">
             <p:contentPart p14:bwMode="auto" r:id="rId102">
               <p14:nvContentPartPr>
                 <p14:cNvPr id="174" name="Ink 173">
@@ -13012,7 +13004,7 @@
               </p14:xfrm>
             </p:contentPart>
           </mc:Choice>
-          <mc:Fallback>
+          <mc:Fallback xmlns="">
             <p:pic>
               <p:nvPicPr>
                 <p:cNvPr id="174" name="Ink 173">
@@ -13043,8 +13035,8 @@
             </p:pic>
           </mc:Fallback>
         </mc:AlternateContent>
-        <mc:AlternateContent xmlns:mc="http://schemas.openxmlformats.org/markup-compatibility/2006">
-          <mc:Choice xmlns:p14="http://schemas.microsoft.com/office/powerpoint/2010/main" xmlns:aink="http://schemas.microsoft.com/office/drawing/2016/ink" Requires="p14 aink">
+        <mc:AlternateContent xmlns:mc="http://schemas.openxmlformats.org/markup-compatibility/2006" xmlns:p14="http://schemas.microsoft.com/office/powerpoint/2010/main" xmlns:aink="http://schemas.microsoft.com/office/drawing/2016/ink">
+          <mc:Choice Requires="p14 aink">
             <p:contentPart p14:bwMode="auto" r:id="rId104">
               <p14:nvContentPartPr>
                 <p14:cNvPr id="177" name="Ink 176">
@@ -13063,7 +13055,7 @@
               </p14:xfrm>
             </p:contentPart>
           </mc:Choice>
-          <mc:Fallback>
+          <mc:Fallback xmlns="">
             <p:pic>
               <p:nvPicPr>
                 <p:cNvPr id="177" name="Ink 176">
@@ -13094,8 +13086,8 @@
             </p:pic>
           </mc:Fallback>
         </mc:AlternateContent>
-        <mc:AlternateContent xmlns:mc="http://schemas.openxmlformats.org/markup-compatibility/2006">
-          <mc:Choice xmlns:p14="http://schemas.microsoft.com/office/powerpoint/2010/main" xmlns:aink="http://schemas.microsoft.com/office/drawing/2016/ink" Requires="p14 aink">
+        <mc:AlternateContent xmlns:mc="http://schemas.openxmlformats.org/markup-compatibility/2006" xmlns:p14="http://schemas.microsoft.com/office/powerpoint/2010/main" xmlns:aink="http://schemas.microsoft.com/office/drawing/2016/ink">
+          <mc:Choice Requires="p14 aink">
             <p:contentPart p14:bwMode="auto" r:id="rId106">
               <p14:nvContentPartPr>
                 <p14:cNvPr id="184" name="Ink 183">
@@ -13114,7 +13106,7 @@
               </p14:xfrm>
             </p:contentPart>
           </mc:Choice>
-          <mc:Fallback>
+          <mc:Fallback xmlns="">
             <p:pic>
               <p:nvPicPr>
                 <p:cNvPr id="184" name="Ink 183">
@@ -13145,8 +13137,8 @@
             </p:pic>
           </mc:Fallback>
         </mc:AlternateContent>
-        <mc:AlternateContent xmlns:mc="http://schemas.openxmlformats.org/markup-compatibility/2006">
-          <mc:Choice xmlns:p14="http://schemas.microsoft.com/office/powerpoint/2010/main" xmlns:aink="http://schemas.microsoft.com/office/drawing/2016/ink" Requires="p14 aink">
+        <mc:AlternateContent xmlns:mc="http://schemas.openxmlformats.org/markup-compatibility/2006" xmlns:p14="http://schemas.microsoft.com/office/powerpoint/2010/main" xmlns:aink="http://schemas.microsoft.com/office/drawing/2016/ink">
+          <mc:Choice Requires="p14 aink">
             <p:contentPart p14:bwMode="auto" r:id="rId108">
               <p14:nvContentPartPr>
                 <p14:cNvPr id="187" name="Ink 186">
@@ -13165,7 +13157,7 @@
               </p14:xfrm>
             </p:contentPart>
           </mc:Choice>
-          <mc:Fallback>
+          <mc:Fallback xmlns="">
             <p:pic>
               <p:nvPicPr>
                 <p:cNvPr id="187" name="Ink 186">
@@ -13196,8 +13188,8 @@
             </p:pic>
           </mc:Fallback>
         </mc:AlternateContent>
-        <mc:AlternateContent xmlns:mc="http://schemas.openxmlformats.org/markup-compatibility/2006">
-          <mc:Choice xmlns:p14="http://schemas.microsoft.com/office/powerpoint/2010/main" xmlns:aink="http://schemas.microsoft.com/office/drawing/2016/ink" Requires="p14 aink">
+        <mc:AlternateContent xmlns:mc="http://schemas.openxmlformats.org/markup-compatibility/2006" xmlns:p14="http://schemas.microsoft.com/office/powerpoint/2010/main" xmlns:aink="http://schemas.microsoft.com/office/drawing/2016/ink">
+          <mc:Choice Requires="p14 aink">
             <p:contentPart p14:bwMode="auto" r:id="rId110">
               <p14:nvContentPartPr>
                 <p14:cNvPr id="190" name="Ink 189">
@@ -13216,7 +13208,7 @@
               </p14:xfrm>
             </p:contentPart>
           </mc:Choice>
-          <mc:Fallback>
+          <mc:Fallback xmlns="">
             <p:pic>
               <p:nvPicPr>
                 <p:cNvPr id="190" name="Ink 189">
@@ -13247,8 +13239,8 @@
             </p:pic>
           </mc:Fallback>
         </mc:AlternateContent>
-        <mc:AlternateContent xmlns:mc="http://schemas.openxmlformats.org/markup-compatibility/2006">
-          <mc:Choice xmlns:p14="http://schemas.microsoft.com/office/powerpoint/2010/main" xmlns:aink="http://schemas.microsoft.com/office/drawing/2016/ink" Requires="p14 aink">
+        <mc:AlternateContent xmlns:mc="http://schemas.openxmlformats.org/markup-compatibility/2006" xmlns:p14="http://schemas.microsoft.com/office/powerpoint/2010/main" xmlns:aink="http://schemas.microsoft.com/office/drawing/2016/ink">
+          <mc:Choice Requires="p14 aink">
             <p:contentPart p14:bwMode="auto" r:id="rId112">
               <p14:nvContentPartPr>
                 <p14:cNvPr id="191" name="Ink 190">
@@ -13267,7 +13259,7 @@
               </p14:xfrm>
             </p:contentPart>
           </mc:Choice>
-          <mc:Fallback>
+          <mc:Fallback xmlns="">
             <p:pic>
               <p:nvPicPr>
                 <p:cNvPr id="191" name="Ink 190">
@@ -13298,8 +13290,8 @@
             </p:pic>
           </mc:Fallback>
         </mc:AlternateContent>
-        <mc:AlternateContent xmlns:mc="http://schemas.openxmlformats.org/markup-compatibility/2006">
-          <mc:Choice xmlns:p14="http://schemas.microsoft.com/office/powerpoint/2010/main" xmlns:aink="http://schemas.microsoft.com/office/drawing/2016/ink" Requires="p14 aink">
+        <mc:AlternateContent xmlns:mc="http://schemas.openxmlformats.org/markup-compatibility/2006" xmlns:p14="http://schemas.microsoft.com/office/powerpoint/2010/main" xmlns:aink="http://schemas.microsoft.com/office/drawing/2016/ink">
+          <mc:Choice Requires="p14 aink">
             <p:contentPart p14:bwMode="auto" r:id="rId114">
               <p14:nvContentPartPr>
                 <p14:cNvPr id="1024" name="Ink 1023">
@@ -13318,7 +13310,7 @@
               </p14:xfrm>
             </p:contentPart>
           </mc:Choice>
-          <mc:Fallback>
+          <mc:Fallback xmlns="">
             <p:pic>
               <p:nvPicPr>
                 <p:cNvPr id="1024" name="Ink 1023">
@@ -13364,14 +13356,14 @@
         </p:nvGrpSpPr>
         <p:grpSpPr>
           <a:xfrm>
-            <a:off x="4335744" y="1681408"/>
+            <a:off x="4433340" y="1666563"/>
             <a:ext cx="1500840" cy="419040"/>
             <a:chOff x="4335744" y="1681408"/>
             <a:chExt cx="1500840" cy="419040"/>
           </a:xfrm>
         </p:grpSpPr>
-        <mc:AlternateContent xmlns:mc="http://schemas.openxmlformats.org/markup-compatibility/2006">
-          <mc:Choice xmlns:p14="http://schemas.microsoft.com/office/powerpoint/2010/main" xmlns:aink="http://schemas.microsoft.com/office/drawing/2016/ink" Requires="p14 aink">
+        <mc:AlternateContent xmlns:mc="http://schemas.openxmlformats.org/markup-compatibility/2006" xmlns:p14="http://schemas.microsoft.com/office/powerpoint/2010/main" xmlns:aink="http://schemas.microsoft.com/office/drawing/2016/ink">
+          <mc:Choice Requires="p14 aink">
             <p:contentPart p14:bwMode="auto" r:id="rId116">
               <p14:nvContentPartPr>
                 <p14:cNvPr id="1040" name="Ink 1039">
@@ -13390,7 +13382,7 @@
               </p14:xfrm>
             </p:contentPart>
           </mc:Choice>
-          <mc:Fallback>
+          <mc:Fallback xmlns="">
             <p:pic>
               <p:nvPicPr>
                 <p:cNvPr id="1040" name="Ink 1039">
@@ -13421,8 +13413,8 @@
             </p:pic>
           </mc:Fallback>
         </mc:AlternateContent>
-        <mc:AlternateContent xmlns:mc="http://schemas.openxmlformats.org/markup-compatibility/2006">
-          <mc:Choice xmlns:p14="http://schemas.microsoft.com/office/powerpoint/2010/main" xmlns:aink="http://schemas.microsoft.com/office/drawing/2016/ink" Requires="p14 aink">
+        <mc:AlternateContent xmlns:mc="http://schemas.openxmlformats.org/markup-compatibility/2006" xmlns:p14="http://schemas.microsoft.com/office/powerpoint/2010/main" xmlns:aink="http://schemas.microsoft.com/office/drawing/2016/ink">
+          <mc:Choice Requires="p14 aink">
             <p:contentPart p14:bwMode="auto" r:id="rId118">
               <p14:nvContentPartPr>
                 <p14:cNvPr id="1041" name="Ink 1040">
@@ -13441,7 +13433,7 @@
               </p14:xfrm>
             </p:contentPart>
           </mc:Choice>
-          <mc:Fallback>
+          <mc:Fallback xmlns="">
             <p:pic>
               <p:nvPicPr>
                 <p:cNvPr id="1041" name="Ink 1040">
@@ -13472,8 +13464,8 @@
             </p:pic>
           </mc:Fallback>
         </mc:AlternateContent>
-        <mc:AlternateContent xmlns:mc="http://schemas.openxmlformats.org/markup-compatibility/2006">
-          <mc:Choice xmlns:p14="http://schemas.microsoft.com/office/powerpoint/2010/main" xmlns:aink="http://schemas.microsoft.com/office/drawing/2016/ink" Requires="p14 aink">
+        <mc:AlternateContent xmlns:mc="http://schemas.openxmlformats.org/markup-compatibility/2006" xmlns:p14="http://schemas.microsoft.com/office/powerpoint/2010/main" xmlns:aink="http://schemas.microsoft.com/office/drawing/2016/ink">
+          <mc:Choice Requires="p14 aink">
             <p:contentPart p14:bwMode="auto" r:id="rId120">
               <p14:nvContentPartPr>
                 <p14:cNvPr id="1042" name="Ink 1041">
@@ -13492,7 +13484,7 @@
               </p14:xfrm>
             </p:contentPart>
           </mc:Choice>
-          <mc:Fallback>
+          <mc:Fallback xmlns="">
             <p:pic>
               <p:nvPicPr>
                 <p:cNvPr id="1042" name="Ink 1041">
@@ -13523,8 +13515,8 @@
             </p:pic>
           </mc:Fallback>
         </mc:AlternateContent>
-        <mc:AlternateContent xmlns:mc="http://schemas.openxmlformats.org/markup-compatibility/2006">
-          <mc:Choice xmlns:p14="http://schemas.microsoft.com/office/powerpoint/2010/main" xmlns:aink="http://schemas.microsoft.com/office/drawing/2016/ink" Requires="p14 aink">
+        <mc:AlternateContent xmlns:mc="http://schemas.openxmlformats.org/markup-compatibility/2006" xmlns:p14="http://schemas.microsoft.com/office/powerpoint/2010/main" xmlns:aink="http://schemas.microsoft.com/office/drawing/2016/ink">
+          <mc:Choice Requires="p14 aink">
             <p:contentPart p14:bwMode="auto" r:id="rId122">
               <p14:nvContentPartPr>
                 <p14:cNvPr id="1043" name="Ink 1042">
@@ -13543,7 +13535,7 @@
               </p14:xfrm>
             </p:contentPart>
           </mc:Choice>
-          <mc:Fallback>
+          <mc:Fallback xmlns="">
             <p:pic>
               <p:nvPicPr>
                 <p:cNvPr id="1043" name="Ink 1042">
@@ -13574,8 +13566,8 @@
             </p:pic>
           </mc:Fallback>
         </mc:AlternateContent>
-        <mc:AlternateContent xmlns:mc="http://schemas.openxmlformats.org/markup-compatibility/2006">
-          <mc:Choice xmlns:p14="http://schemas.microsoft.com/office/powerpoint/2010/main" xmlns:aink="http://schemas.microsoft.com/office/drawing/2016/ink" Requires="p14 aink">
+        <mc:AlternateContent xmlns:mc="http://schemas.openxmlformats.org/markup-compatibility/2006" xmlns:p14="http://schemas.microsoft.com/office/powerpoint/2010/main" xmlns:aink="http://schemas.microsoft.com/office/drawing/2016/ink">
+          <mc:Choice Requires="p14 aink">
             <p:contentPart p14:bwMode="auto" r:id="rId124">
               <p14:nvContentPartPr>
                 <p14:cNvPr id="1044" name="Ink 1043">
@@ -13594,7 +13586,7 @@
               </p14:xfrm>
             </p:contentPart>
           </mc:Choice>
-          <mc:Fallback>
+          <mc:Fallback xmlns="">
             <p:pic>
               <p:nvPicPr>
                 <p:cNvPr id="1044" name="Ink 1043">
@@ -13625,8 +13617,8 @@
             </p:pic>
           </mc:Fallback>
         </mc:AlternateContent>
-        <mc:AlternateContent xmlns:mc="http://schemas.openxmlformats.org/markup-compatibility/2006">
-          <mc:Choice xmlns:p14="http://schemas.microsoft.com/office/powerpoint/2010/main" xmlns:aink="http://schemas.microsoft.com/office/drawing/2016/ink" Requires="p14 aink">
+        <mc:AlternateContent xmlns:mc="http://schemas.openxmlformats.org/markup-compatibility/2006" xmlns:p14="http://schemas.microsoft.com/office/powerpoint/2010/main" xmlns:aink="http://schemas.microsoft.com/office/drawing/2016/ink">
+          <mc:Choice Requires="p14 aink">
             <p:contentPart p14:bwMode="auto" r:id="rId126">
               <p14:nvContentPartPr>
                 <p14:cNvPr id="1045" name="Ink 1044">
@@ -13645,7 +13637,7 @@
               </p14:xfrm>
             </p:contentPart>
           </mc:Choice>
-          <mc:Fallback>
+          <mc:Fallback xmlns="">
             <p:pic>
               <p:nvPicPr>
                 <p:cNvPr id="1045" name="Ink 1044">
@@ -13676,8 +13668,8 @@
             </p:pic>
           </mc:Fallback>
         </mc:AlternateContent>
-        <mc:AlternateContent xmlns:mc="http://schemas.openxmlformats.org/markup-compatibility/2006">
-          <mc:Choice xmlns:p14="http://schemas.microsoft.com/office/powerpoint/2010/main" xmlns:aink="http://schemas.microsoft.com/office/drawing/2016/ink" Requires="p14 aink">
+        <mc:AlternateContent xmlns:mc="http://schemas.openxmlformats.org/markup-compatibility/2006" xmlns:p14="http://schemas.microsoft.com/office/powerpoint/2010/main" xmlns:aink="http://schemas.microsoft.com/office/drawing/2016/ink">
+          <mc:Choice Requires="p14 aink">
             <p:contentPart p14:bwMode="auto" r:id="rId128">
               <p14:nvContentPartPr>
                 <p14:cNvPr id="1046" name="Ink 1045">
@@ -13696,7 +13688,7 @@
               </p14:xfrm>
             </p:contentPart>
           </mc:Choice>
-          <mc:Fallback>
+          <mc:Fallback xmlns="">
             <p:pic>
               <p:nvPicPr>
                 <p:cNvPr id="1046" name="Ink 1045">
@@ -13742,14 +13734,14 @@
         </p:nvGrpSpPr>
         <p:grpSpPr>
           <a:xfrm>
-            <a:off x="5917224" y="1606888"/>
+            <a:off x="6014820" y="1592043"/>
             <a:ext cx="807480" cy="359640"/>
             <a:chOff x="5917224" y="1606888"/>
             <a:chExt cx="807480" cy="359640"/>
           </a:xfrm>
         </p:grpSpPr>
-        <mc:AlternateContent xmlns:mc="http://schemas.openxmlformats.org/markup-compatibility/2006">
-          <mc:Choice xmlns:p14="http://schemas.microsoft.com/office/powerpoint/2010/main" xmlns:aink="http://schemas.microsoft.com/office/drawing/2016/ink" Requires="p14 aink">
+        <mc:AlternateContent xmlns:mc="http://schemas.openxmlformats.org/markup-compatibility/2006" xmlns:p14="http://schemas.microsoft.com/office/powerpoint/2010/main" xmlns:aink="http://schemas.microsoft.com/office/drawing/2016/ink">
+          <mc:Choice Requires="p14 aink">
             <p:contentPart p14:bwMode="auto" r:id="rId130">
               <p14:nvContentPartPr>
                 <p14:cNvPr id="1047" name="Ink 1046">
@@ -13768,7 +13760,7 @@
               </p14:xfrm>
             </p:contentPart>
           </mc:Choice>
-          <mc:Fallback>
+          <mc:Fallback xmlns="">
             <p:pic>
               <p:nvPicPr>
                 <p:cNvPr id="1047" name="Ink 1046">
@@ -13799,8 +13791,8 @@
             </p:pic>
           </mc:Fallback>
         </mc:AlternateContent>
-        <mc:AlternateContent xmlns:mc="http://schemas.openxmlformats.org/markup-compatibility/2006">
-          <mc:Choice xmlns:p14="http://schemas.microsoft.com/office/powerpoint/2010/main" xmlns:aink="http://schemas.microsoft.com/office/drawing/2016/ink" Requires="p14 aink">
+        <mc:AlternateContent xmlns:mc="http://schemas.openxmlformats.org/markup-compatibility/2006" xmlns:p14="http://schemas.microsoft.com/office/powerpoint/2010/main" xmlns:aink="http://schemas.microsoft.com/office/drawing/2016/ink">
+          <mc:Choice Requires="p14 aink">
             <p:contentPart p14:bwMode="auto" r:id="rId132">
               <p14:nvContentPartPr>
                 <p14:cNvPr id="1048" name="Ink 1047">
@@ -13819,7 +13811,7 @@
               </p14:xfrm>
             </p:contentPart>
           </mc:Choice>
-          <mc:Fallback>
+          <mc:Fallback xmlns="">
             <p:pic>
               <p:nvPicPr>
                 <p:cNvPr id="1048" name="Ink 1047">
@@ -13850,8 +13842,8 @@
             </p:pic>
           </mc:Fallback>
         </mc:AlternateContent>
-        <mc:AlternateContent xmlns:mc="http://schemas.openxmlformats.org/markup-compatibility/2006">
-          <mc:Choice xmlns:p14="http://schemas.microsoft.com/office/powerpoint/2010/main" xmlns:aink="http://schemas.microsoft.com/office/drawing/2016/ink" Requires="p14 aink">
+        <mc:AlternateContent xmlns:mc="http://schemas.openxmlformats.org/markup-compatibility/2006" xmlns:p14="http://schemas.microsoft.com/office/powerpoint/2010/main" xmlns:aink="http://schemas.microsoft.com/office/drawing/2016/ink">
+          <mc:Choice Requires="p14 aink">
             <p:contentPart p14:bwMode="auto" r:id="rId134">
               <p14:nvContentPartPr>
                 <p14:cNvPr id="1049" name="Ink 1048">
@@ -13870,7 +13862,7 @@
               </p14:xfrm>
             </p:contentPart>
           </mc:Choice>
-          <mc:Fallback>
+          <mc:Fallback xmlns="">
             <p:pic>
               <p:nvPicPr>
                 <p:cNvPr id="1049" name="Ink 1048">
@@ -13901,8 +13893,8 @@
             </p:pic>
           </mc:Fallback>
         </mc:AlternateContent>
-        <mc:AlternateContent xmlns:mc="http://schemas.openxmlformats.org/markup-compatibility/2006">
-          <mc:Choice xmlns:p14="http://schemas.microsoft.com/office/powerpoint/2010/main" xmlns:aink="http://schemas.microsoft.com/office/drawing/2016/ink" Requires="p14 aink">
+        <mc:AlternateContent xmlns:mc="http://schemas.openxmlformats.org/markup-compatibility/2006" xmlns:p14="http://schemas.microsoft.com/office/powerpoint/2010/main" xmlns:aink="http://schemas.microsoft.com/office/drawing/2016/ink">
+          <mc:Choice Requires="p14 aink">
             <p:contentPart p14:bwMode="auto" r:id="rId136">
               <p14:nvContentPartPr>
                 <p14:cNvPr id="1050" name="Ink 1049">
@@ -13921,7 +13913,7 @@
               </p14:xfrm>
             </p:contentPart>
           </mc:Choice>
-          <mc:Fallback>
+          <mc:Fallback xmlns="">
             <p:pic>
               <p:nvPicPr>
                 <p:cNvPr id="1050" name="Ink 1049">
@@ -13952,8 +13944,8 @@
             </p:pic>
           </mc:Fallback>
         </mc:AlternateContent>
-        <mc:AlternateContent xmlns:mc="http://schemas.openxmlformats.org/markup-compatibility/2006">
-          <mc:Choice xmlns:p14="http://schemas.microsoft.com/office/powerpoint/2010/main" xmlns:aink="http://schemas.microsoft.com/office/drawing/2016/ink" Requires="p14 aink">
+        <mc:AlternateContent xmlns:mc="http://schemas.openxmlformats.org/markup-compatibility/2006" xmlns:p14="http://schemas.microsoft.com/office/powerpoint/2010/main" xmlns:aink="http://schemas.microsoft.com/office/drawing/2016/ink">
+          <mc:Choice Requires="p14 aink">
             <p:contentPart p14:bwMode="auto" r:id="rId138">
               <p14:nvContentPartPr>
                 <p14:cNvPr id="1051" name="Ink 1050">
@@ -13972,7 +13964,7 @@
               </p14:xfrm>
             </p:contentPart>
           </mc:Choice>
-          <mc:Fallback>
+          <mc:Fallback xmlns="">
             <p:pic>
               <p:nvPicPr>
                 <p:cNvPr id="1051" name="Ink 1050">
@@ -14003,8 +13995,8 @@
             </p:pic>
           </mc:Fallback>
         </mc:AlternateContent>
-        <mc:AlternateContent xmlns:mc="http://schemas.openxmlformats.org/markup-compatibility/2006">
-          <mc:Choice xmlns:p14="http://schemas.microsoft.com/office/powerpoint/2010/main" xmlns:aink="http://schemas.microsoft.com/office/drawing/2016/ink" Requires="p14 aink">
+        <mc:AlternateContent xmlns:mc="http://schemas.openxmlformats.org/markup-compatibility/2006" xmlns:p14="http://schemas.microsoft.com/office/powerpoint/2010/main" xmlns:aink="http://schemas.microsoft.com/office/drawing/2016/ink">
+          <mc:Choice Requires="p14 aink">
             <p:contentPart p14:bwMode="auto" r:id="rId140">
               <p14:nvContentPartPr>
                 <p14:cNvPr id="1052" name="Ink 1051">
@@ -14023,7 +14015,7 @@
               </p14:xfrm>
             </p:contentPart>
           </mc:Choice>
-          <mc:Fallback>
+          <mc:Fallback xmlns="">
             <p:pic>
               <p:nvPicPr>
                 <p:cNvPr id="1052" name="Ink 1051">
@@ -14055,8 +14047,8 @@
           </mc:Fallback>
         </mc:AlternateContent>
       </p:grpSp>
-      <mc:AlternateContent xmlns:mc="http://schemas.openxmlformats.org/markup-compatibility/2006">
-        <mc:Choice xmlns:p14="http://schemas.microsoft.com/office/powerpoint/2010/main" xmlns:aink="http://schemas.microsoft.com/office/drawing/2016/ink" Requires="p14 aink">
+      <mc:AlternateContent xmlns:mc="http://schemas.openxmlformats.org/markup-compatibility/2006" xmlns:p14="http://schemas.microsoft.com/office/powerpoint/2010/main" xmlns:aink="http://schemas.microsoft.com/office/drawing/2016/ink">
+        <mc:Choice Requires="p14 aink">
           <p:contentPart p14:bwMode="auto" r:id="rId142">
             <p14:nvContentPartPr>
               <p14:cNvPr id="1057" name="Ink 1056">
@@ -14075,7 +14067,7 @@
             </p14:xfrm>
           </p:contentPart>
         </mc:Choice>
-        <mc:Fallback>
+        <mc:Fallback xmlns="">
           <p:pic>
             <p:nvPicPr>
               <p:cNvPr id="1057" name="Ink 1056">

</xml_diff>